<commit_message>
Jupyter notebook examples via GSKY
</commit_message>
<xml_diff>
--- a/Documents/ows/GSKY_Demo_Notebooks.pptx
+++ b/Documents/ows/GSKY_Demo_Notebooks.pptx
@@ -5,10 +5,10 @@
     <p:sldMasterId id="2147483842" r:id="rId1"/>
   </p:sldMasterIdLst>
   <p:notesMasterIdLst>
-    <p:notesMasterId r:id="rId8"/>
+    <p:notesMasterId r:id="rId10"/>
   </p:notesMasterIdLst>
   <p:handoutMasterIdLst>
-    <p:handoutMasterId r:id="rId9"/>
+    <p:handoutMasterId r:id="rId11"/>
   </p:handoutMasterIdLst>
   <p:sldIdLst>
     <p:sldId id="258" r:id="rId2"/>
@@ -17,6 +17,8 @@
     <p:sldId id="267" r:id="rId5"/>
     <p:sldId id="264" r:id="rId6"/>
     <p:sldId id="263" r:id="rId7"/>
+    <p:sldId id="268" r:id="rId8"/>
+    <p:sldId id="269" r:id="rId9"/>
   </p:sldIdLst>
   <p:sldSz cx="12192000" cy="6858000"/>
   <p:notesSz cx="6858000" cy="9144000"/>
@@ -220,7 +222,7 @@
           <a:p>
             <a:fld id="{3586DA7A-B0C3-AF45-BAF3-F6E782A524C2}" type="datetimeFigureOut">
               <a:rPr lang="en-US" smtClean="0"/>
-              <a:t>10/19/2019</a:t>
+              <a:t>10/26/2019</a:t>
             </a:fld>
             <a:endParaRPr lang="en-US"/>
           </a:p>
@@ -397,7 +399,7 @@
           <a:p>
             <a:fld id="{F49800D1-723B-8E4F-A5C4-3C3C8522EA2E}" type="datetimeFigureOut">
               <a:rPr lang="en-US" smtClean="0"/>
-              <a:t>10/18/2019</a:t>
+              <a:t>10/26/2019</a:t>
             </a:fld>
             <a:endParaRPr lang="en-US"/>
           </a:p>
@@ -1664,7 +1666,7 @@
           <a:p>
             <a:fld id="{752A2302-4E20-CB47-9D44-B9F34CD986BC}" type="datetime2">
               <a:rPr lang="en-AU" smtClean="0"/>
-              <a:t>Friday, 18 October 2019</a:t>
+              <a:t>Saturday, 26 October 2019</a:t>
             </a:fld>
             <a:endParaRPr lang="en-US" dirty="0"/>
           </a:p>
@@ -1845,7 +1847,7 @@
           <a:p>
             <a:fld id="{92BB2029-5214-564A-99C0-07765A28D936}" type="datetime2">
               <a:rPr lang="en-AU" smtClean="0"/>
-              <a:t>Friday, 18 October 2019</a:t>
+              <a:t>Saturday, 26 October 2019</a:t>
             </a:fld>
             <a:endParaRPr lang="en-US" dirty="0"/>
           </a:p>
@@ -2091,7 +2093,7 @@
           <a:p>
             <a:fld id="{BE93C838-1EF0-0545-BFF5-78E4C361A661}" type="datetime2">
               <a:rPr lang="en-AU" smtClean="0"/>
-              <a:t>Friday, 18 October 2019</a:t>
+              <a:t>Saturday, 26 October 2019</a:t>
             </a:fld>
             <a:endParaRPr lang="en-US" dirty="0"/>
           </a:p>
@@ -2860,7 +2862,7 @@
           <a:p>
             <a:fld id="{B50792BD-108E-574E-8FCE-777E69D78FA9}" type="datetime2">
               <a:rPr lang="en-AU" smtClean="0"/>
-              <a:t>Friday, 18 October 2019</a:t>
+              <a:t>Saturday, 26 October 2019</a:t>
             </a:fld>
             <a:endParaRPr lang="en-US" dirty="0"/>
           </a:p>
@@ -3562,7 +3564,7 @@
           <a:p>
             <a:fld id="{89B1171B-4260-3B4B-BCB8-7B4A81607ACD}" type="datetime2">
               <a:rPr lang="en-AU" smtClean="0"/>
-              <a:t>Friday, 18 October 2019</a:t>
+              <a:t>Saturday, 26 October 2019</a:t>
             </a:fld>
             <a:endParaRPr lang="en-US" dirty="0"/>
           </a:p>
@@ -3717,7 +3719,7 @@
           <a:p>
             <a:fld id="{6C5F12B0-F81A-DB4D-AAAD-60AACFE3ADC2}" type="datetime2">
               <a:rPr lang="en-AU" smtClean="0"/>
-              <a:t>Friday, 18 October 2019</a:t>
+              <a:t>Saturday, 26 October 2019</a:t>
             </a:fld>
             <a:endParaRPr lang="en-US" dirty="0"/>
           </a:p>
@@ -3983,7 +3985,7 @@
           <a:p>
             <a:fld id="{6CE919B9-56FE-624A-BF69-6ED8824F7416}" type="datetime2">
               <a:rPr lang="en-AU" smtClean="0"/>
-              <a:t>Friday, 18 October 2019</a:t>
+              <a:t>Saturday, 26 October 2019</a:t>
             </a:fld>
             <a:endParaRPr lang="en-US" dirty="0"/>
           </a:p>
@@ -4231,7 +4233,7 @@
           <a:p>
             <a:fld id="{D98CF2DA-D6E4-5744-9742-A4E5F6FE3C7F}" type="datetime2">
               <a:rPr lang="en-AU" smtClean="0"/>
-              <a:t>Friday, 18 October 2019</a:t>
+              <a:t>Saturday, 26 October 2019</a:t>
             </a:fld>
             <a:endParaRPr lang="en-US" dirty="0"/>
           </a:p>
@@ -4597,7 +4599,7 @@
           <a:p>
             <a:fld id="{8E6438A0-6F26-C445-BC88-13443616DE49}" type="datetime2">
               <a:rPr lang="en-AU" smtClean="0"/>
-              <a:t>Friday, 18 October 2019</a:t>
+              <a:t>Saturday, 26 October 2019</a:t>
             </a:fld>
             <a:endParaRPr lang="en-US" dirty="0"/>
           </a:p>
@@ -4709,7 +4711,7 @@
           <a:p>
             <a:fld id="{6CB331E8-383C-184B-8A47-77035BFB83CD}" type="datetime2">
               <a:rPr lang="en-AU" smtClean="0"/>
-              <a:t>Friday, 18 October 2019</a:t>
+              <a:t>Saturday, 26 October 2019</a:t>
             </a:fld>
             <a:endParaRPr lang="en-US" dirty="0"/>
           </a:p>
@@ -4789,7 +4791,7 @@
           <a:p>
             <a:fld id="{2389EB56-3877-2E44-A0C6-F6C6B78D3E24}" type="datetime2">
               <a:rPr lang="en-AU" smtClean="0"/>
-              <a:t>Friday, 18 October 2019</a:t>
+              <a:t>Saturday, 26 October 2019</a:t>
             </a:fld>
             <a:endParaRPr lang="en-US" dirty="0"/>
           </a:p>
@@ -5019,7 +5021,7 @@
           <a:p>
             <a:fld id="{F0B28167-27F6-1E46-9A66-EEE292BD7E82}" type="datetime2">
               <a:rPr lang="en-AU" smtClean="0"/>
-              <a:t>Friday, 18 October 2019</a:t>
+              <a:t>Saturday, 26 October 2019</a:t>
             </a:fld>
             <a:endParaRPr lang="en-US" dirty="0"/>
           </a:p>
@@ -5287,7 +5289,7 @@
           <a:p>
             <a:fld id="{97A73174-9EB3-7343-973A-AB1D6FFF9DDC}" type="datetime2">
               <a:rPr lang="en-AU" smtClean="0"/>
-              <a:t>Friday, 18 October 2019</a:t>
+              <a:t>Saturday, 26 October 2019</a:t>
             </a:fld>
             <a:endParaRPr lang="en-US" dirty="0"/>
           </a:p>
@@ -5549,7 +5551,7 @@
           <a:p>
             <a:fld id="{5DFD8B33-5443-E342-BFD4-537524AEC376}" type="datetime2">
               <a:rPr lang="en-AU" smtClean="0"/>
-              <a:t>Friday, 18 October 2019</a:t>
+              <a:t>Saturday, 26 October 2019</a:t>
             </a:fld>
             <a:endParaRPr lang="en-US" dirty="0"/>
           </a:p>
@@ -6383,7 +6385,7 @@
           <a:p>
             <a:fld id="{5DD32331-6ADC-E246-8B08-E74D7A4A5EDF}" type="datetime2">
               <a:rPr lang="en-AU" smtClean="0"/>
-              <a:t>Friday, 18 October 2019</a:t>
+              <a:t>Saturday, 26 October 2019</a:t>
             </a:fld>
             <a:endParaRPr lang="en-US" dirty="0"/>
           </a:p>
@@ -6686,7 +6688,7 @@
           <a:p>
             <a:fld id="{5DD32331-6ADC-E246-8B08-E74D7A4A5EDF}" type="datetime2">
               <a:rPr lang="en-AU" smtClean="0"/>
-              <a:t>Friday, 18 October 2019</a:t>
+              <a:t>Saturday, 26 October 2019</a:t>
             </a:fld>
             <a:endParaRPr lang="en-US" dirty="0"/>
           </a:p>
@@ -6871,7 +6873,7 @@
           <a:graphicData uri="http://schemas.openxmlformats.org/presentationml/2006/ole">
             <mc:AlternateContent xmlns:mc="http://schemas.openxmlformats.org/markup-compatibility/2006">
               <mc:Choice xmlns:v="urn:schemas-microsoft-com:vml" Requires="v">
-                <p:oleObj spid="_x0000_s1042" name="Packager Shell Object" showAsIcon="1" r:id="rId7" imgW="1593360" imgH="589680" progId="Package">
+                <p:oleObj spid="_x0000_s1041" name="Packager Shell Object" showAsIcon="1" r:id="rId7" imgW="1593360" imgH="589680" progId="Package">
                   <p:embed/>
                 </p:oleObj>
               </mc:Choice>
@@ -7428,7 +7430,7 @@
           <a:p>
             <a:fld id="{5DD32331-6ADC-E246-8B08-E74D7A4A5EDF}" type="datetime2">
               <a:rPr lang="en-AU" smtClean="0"/>
-              <a:t>Friday, 18 October 2019</a:t>
+              <a:t>Saturday, 26 October 2019</a:t>
             </a:fld>
             <a:endParaRPr lang="en-US" dirty="0"/>
           </a:p>
@@ -7582,41 +7584,6 @@
       </p:pic>
       <p:pic>
         <p:nvPicPr>
-          <p:cNvPr id="19" name="Picture 18">
-            <a:extLst>
-              <a:ext uri="{FF2B5EF4-FFF2-40B4-BE49-F238E27FC236}">
-                <a16:creationId xmlns:a16="http://schemas.microsoft.com/office/drawing/2014/main" id="{1A9E6C43-EA01-4D74-AA6D-0DF94108E00B}"/>
-              </a:ext>
-            </a:extLst>
-          </p:cNvPr>
-          <p:cNvPicPr>
-            <a:picLocks noChangeAspect="1"/>
-          </p:cNvPicPr>
-          <p:nvPr/>
-        </p:nvPicPr>
-        <p:blipFill>
-          <a:blip r:embed="rId4"/>
-          <a:stretch>
-            <a:fillRect/>
-          </a:stretch>
-        </p:blipFill>
-        <p:spPr>
-          <a:xfrm>
-            <a:off x="8832685" y="1956788"/>
-            <a:ext cx="2356683" cy="639994"/>
-          </a:xfrm>
-          <a:prstGeom prst="rect">
-            <a:avLst/>
-          </a:prstGeom>
-          <a:ln w="3175">
-            <a:solidFill>
-              <a:schemeClr val="tx1"/>
-            </a:solidFill>
-          </a:ln>
-        </p:spPr>
-      </p:pic>
-      <p:pic>
-        <p:nvPicPr>
           <p:cNvPr id="20" name="Picture 19">
             <a:extLst>
               <a:ext uri="{FF2B5EF4-FFF2-40B4-BE49-F238E27FC236}">
@@ -7630,7 +7597,7 @@
           <p:nvPr/>
         </p:nvPicPr>
         <p:blipFill>
-          <a:blip r:embed="rId5"/>
+          <a:blip r:embed="rId4"/>
           <a:stretch>
             <a:fillRect/>
           </a:stretch>
@@ -7650,58 +7617,6 @@
           </a:ln>
         </p:spPr>
       </p:pic>
-      <p:sp>
-        <p:nvSpPr>
-          <p:cNvPr id="21" name="Rectangle 20">
-            <a:extLst>
-              <a:ext uri="{FF2B5EF4-FFF2-40B4-BE49-F238E27FC236}">
-                <a16:creationId xmlns:a16="http://schemas.microsoft.com/office/drawing/2014/main" id="{B8779DF1-855C-4FAC-9DAC-3CFD46EB1EDA}"/>
-              </a:ext>
-            </a:extLst>
-          </p:cNvPr>
-          <p:cNvSpPr/>
-          <p:nvPr/>
-        </p:nvSpPr>
-        <p:spPr>
-          <a:xfrm>
-            <a:off x="9745579" y="2454442"/>
-            <a:ext cx="530742" cy="142340"/>
-          </a:xfrm>
-          <a:prstGeom prst="rect">
-            <a:avLst/>
-          </a:prstGeom>
-          <a:noFill/>
-          <a:ln>
-            <a:solidFill>
-              <a:srgbClr val="FF0000"/>
-            </a:solidFill>
-          </a:ln>
-        </p:spPr>
-        <p:style>
-          <a:lnRef idx="2">
-            <a:schemeClr val="accent1">
-              <a:shade val="50000"/>
-            </a:schemeClr>
-          </a:lnRef>
-          <a:fillRef idx="1">
-            <a:schemeClr val="accent1"/>
-          </a:fillRef>
-          <a:effectRef idx="0">
-            <a:schemeClr val="accent1"/>
-          </a:effectRef>
-          <a:fontRef idx="minor">
-            <a:schemeClr val="lt1"/>
-          </a:fontRef>
-        </p:style>
-        <p:txBody>
-          <a:bodyPr rtlCol="0" anchor="ctr"/>
-          <a:lstStyle/>
-          <a:p>
-            <a:pPr algn="ctr"/>
-            <a:endParaRPr lang="en-AU"/>
-          </a:p>
-        </p:txBody>
-      </p:sp>
       <p:pic>
         <p:nvPicPr>
           <p:cNvPr id="23" name="Picture 22">
@@ -7717,7 +7632,7 @@
           <p:nvPr/>
         </p:nvPicPr>
         <p:blipFill>
-          <a:blip r:embed="rId6"/>
+          <a:blip r:embed="rId5"/>
           <a:stretch>
             <a:fillRect/>
           </a:stretch>
@@ -7799,7 +7714,7 @@
           <p:nvPr/>
         </p:nvPicPr>
         <p:blipFill>
-          <a:blip r:embed="rId7"/>
+          <a:blip r:embed="rId6"/>
           <a:stretch>
             <a:fillRect/>
           </a:stretch>
@@ -7814,6 +7729,93 @@
           </a:prstGeom>
         </p:spPr>
       </p:pic>
+      <p:pic>
+        <p:nvPicPr>
+          <p:cNvPr id="19" name="Picture 18">
+            <a:extLst>
+              <a:ext uri="{FF2B5EF4-FFF2-40B4-BE49-F238E27FC236}">
+                <a16:creationId xmlns:a16="http://schemas.microsoft.com/office/drawing/2014/main" id="{1A9E6C43-EA01-4D74-AA6D-0DF94108E00B}"/>
+              </a:ext>
+            </a:extLst>
+          </p:cNvPr>
+          <p:cNvPicPr>
+            <a:picLocks noChangeAspect="1"/>
+          </p:cNvPicPr>
+          <p:nvPr/>
+        </p:nvPicPr>
+        <p:blipFill>
+          <a:blip r:embed="rId7"/>
+          <a:stretch>
+            <a:fillRect/>
+          </a:stretch>
+        </p:blipFill>
+        <p:spPr>
+          <a:xfrm>
+            <a:off x="8758107" y="1612839"/>
+            <a:ext cx="2431262" cy="639994"/>
+          </a:xfrm>
+          <a:prstGeom prst="rect">
+            <a:avLst/>
+          </a:prstGeom>
+          <a:ln w="3175">
+            <a:solidFill>
+              <a:schemeClr val="tx1"/>
+            </a:solidFill>
+          </a:ln>
+        </p:spPr>
+      </p:pic>
+      <p:sp>
+        <p:nvSpPr>
+          <p:cNvPr id="21" name="Rectangle 20">
+            <a:extLst>
+              <a:ext uri="{FF2B5EF4-FFF2-40B4-BE49-F238E27FC236}">
+                <a16:creationId xmlns:a16="http://schemas.microsoft.com/office/drawing/2014/main" id="{B8779DF1-855C-4FAC-9DAC-3CFD46EB1EDA}"/>
+              </a:ext>
+            </a:extLst>
+          </p:cNvPr>
+          <p:cNvSpPr/>
+          <p:nvPr/>
+        </p:nvSpPr>
+        <p:spPr>
+          <a:xfrm>
+            <a:off x="9703634" y="2118882"/>
+            <a:ext cx="530742" cy="142340"/>
+          </a:xfrm>
+          <a:prstGeom prst="rect">
+            <a:avLst/>
+          </a:prstGeom>
+          <a:noFill/>
+          <a:ln>
+            <a:solidFill>
+              <a:srgbClr val="FF0000"/>
+            </a:solidFill>
+          </a:ln>
+        </p:spPr>
+        <p:style>
+          <a:lnRef idx="2">
+            <a:schemeClr val="accent1">
+              <a:shade val="50000"/>
+            </a:schemeClr>
+          </a:lnRef>
+          <a:fillRef idx="1">
+            <a:schemeClr val="accent1"/>
+          </a:fillRef>
+          <a:effectRef idx="0">
+            <a:schemeClr val="accent1"/>
+          </a:effectRef>
+          <a:fontRef idx="minor">
+            <a:schemeClr val="lt1"/>
+          </a:fontRef>
+        </p:style>
+        <p:txBody>
+          <a:bodyPr rtlCol="0" anchor="ctr"/>
+          <a:lstStyle/>
+          <a:p>
+            <a:pPr algn="ctr"/>
+            <a:endParaRPr lang="en-AU"/>
+          </a:p>
+        </p:txBody>
+      </p:sp>
     </p:spTree>
     <p:extLst>
       <p:ext uri="{BB962C8B-B14F-4D97-AF65-F5344CB8AC3E}">
@@ -8470,8 +8472,8 @@
     </p:tnLst>
     <p:bldLst>
       <p:bldP spid="14" grpId="0" animBg="1"/>
+      <p:bldP spid="24" grpId="0" animBg="1"/>
       <p:bldP spid="21" grpId="0" animBg="1"/>
-      <p:bldP spid="24" grpId="0" animBg="1"/>
     </p:bldLst>
   </p:timing>
 </p:sld>
@@ -8696,7 +8698,7 @@
           <a:p>
             <a:fld id="{5DD32331-6ADC-E246-8B08-E74D7A4A5EDF}" type="datetime2">
               <a:rPr lang="en-AU" smtClean="0"/>
-              <a:t>Sunday, 20 October 2019</a:t>
+              <a:t>Saturday, 26 October 2019</a:t>
             </a:fld>
             <a:endParaRPr lang="en-US" dirty="0"/>
           </a:p>
@@ -9192,7 +9194,7 @@
           <a:p>
             <a:fld id="{5DD32331-6ADC-E246-8B08-E74D7A4A5EDF}" type="datetime2">
               <a:rPr lang="en-AU" smtClean="0"/>
-              <a:t>Sunday, 20 October 2019</a:t>
+              <a:t>Saturday, 26 October 2019</a:t>
             </a:fld>
             <a:endParaRPr lang="en-US" dirty="0"/>
           </a:p>
@@ -9371,6 +9373,182 @@
     <p:extLst>
       <p:ext uri="{BB962C8B-B14F-4D97-AF65-F5344CB8AC3E}">
         <p14:creationId xmlns:p14="http://schemas.microsoft.com/office/powerpoint/2010/main" val="3814420516"/>
+      </p:ext>
+    </p:extLst>
+  </p:cSld>
+  <p:clrMapOvr>
+    <a:masterClrMapping/>
+  </p:clrMapOvr>
+</p:sld>
+</file>
+
+<file path=ppt/slides/slide7.xml><?xml version="1.0" encoding="utf-8"?>
+<p:sld xmlns:a="http://schemas.openxmlformats.org/drawingml/2006/main" xmlns:r="http://schemas.openxmlformats.org/officeDocument/2006/relationships" xmlns:p="http://schemas.openxmlformats.org/presentationml/2006/main">
+  <p:cSld>
+    <p:spTree>
+      <p:nvGrpSpPr>
+        <p:cNvPr id="1" name=""/>
+        <p:cNvGrpSpPr/>
+        <p:nvPr/>
+      </p:nvGrpSpPr>
+      <p:grpSpPr>
+        <a:xfrm>
+          <a:off x="0" y="0"/>
+          <a:ext cx="0" cy="0"/>
+          <a:chOff x="0" y="0"/>
+          <a:chExt cx="0" cy="0"/>
+        </a:xfrm>
+      </p:grpSpPr>
+      <p:sp>
+        <p:nvSpPr>
+          <p:cNvPr id="4" name="Date Placeholder 3">
+            <a:extLst>
+              <a:ext uri="{FF2B5EF4-FFF2-40B4-BE49-F238E27FC236}">
+                <a16:creationId xmlns:a16="http://schemas.microsoft.com/office/drawing/2014/main" id="{68A2AA6F-3EE6-4C30-8194-A7D76E01E0D4}"/>
+              </a:ext>
+            </a:extLst>
+          </p:cNvPr>
+          <p:cNvSpPr>
+            <a:spLocks noGrp="1"/>
+          </p:cNvSpPr>
+          <p:nvPr>
+            <p:ph type="dt" sz="half" idx="10"/>
+          </p:nvPr>
+        </p:nvSpPr>
+        <p:spPr/>
+        <p:txBody>
+          <a:bodyPr/>
+          <a:lstStyle/>
+          <a:p>
+            <a:fld id="{6C5F12B0-F81A-DB4D-AAAD-60AACFE3ADC2}" type="datetime2">
+              <a:rPr lang="en-AU" smtClean="0"/>
+              <a:t>Saturday, 26 October 2019</a:t>
+            </a:fld>
+            <a:endParaRPr lang="en-US" dirty="0"/>
+          </a:p>
+        </p:txBody>
+      </p:sp>
+      <p:sp>
+        <p:nvSpPr>
+          <p:cNvPr id="5" name="Slide Number Placeholder 4">
+            <a:extLst>
+              <a:ext uri="{FF2B5EF4-FFF2-40B4-BE49-F238E27FC236}">
+                <a16:creationId xmlns:a16="http://schemas.microsoft.com/office/drawing/2014/main" id="{685C58BE-378D-4A26-8E3A-1BF97E4DC73B}"/>
+              </a:ext>
+            </a:extLst>
+          </p:cNvPr>
+          <p:cNvSpPr>
+            <a:spLocks noGrp="1"/>
+          </p:cNvSpPr>
+          <p:nvPr>
+            <p:ph type="sldNum" sz="quarter" idx="12"/>
+          </p:nvPr>
+        </p:nvSpPr>
+        <p:spPr/>
+        <p:txBody>
+          <a:bodyPr/>
+          <a:lstStyle/>
+          <a:p>
+            <a:fld id="{595DB3E5-CC39-264C-BD9B-DB8B2147D646}" type="slidenum">
+              <a:rPr lang="en-US" smtClean="0"/>
+              <a:t>6</a:t>
+            </a:fld>
+            <a:endParaRPr lang="en-US"/>
+          </a:p>
+        </p:txBody>
+      </p:sp>
+    </p:spTree>
+    <p:extLst>
+      <p:ext uri="{BB962C8B-B14F-4D97-AF65-F5344CB8AC3E}">
+        <p14:creationId xmlns:p14="http://schemas.microsoft.com/office/powerpoint/2010/main" val="2657405171"/>
+      </p:ext>
+    </p:extLst>
+  </p:cSld>
+  <p:clrMapOvr>
+    <a:masterClrMapping/>
+  </p:clrMapOvr>
+</p:sld>
+</file>
+
+<file path=ppt/slides/slide8.xml><?xml version="1.0" encoding="utf-8"?>
+<p:sld xmlns:a="http://schemas.openxmlformats.org/drawingml/2006/main" xmlns:r="http://schemas.openxmlformats.org/officeDocument/2006/relationships" xmlns:p="http://schemas.openxmlformats.org/presentationml/2006/main">
+  <p:cSld>
+    <p:spTree>
+      <p:nvGrpSpPr>
+        <p:cNvPr id="1" name=""/>
+        <p:cNvGrpSpPr/>
+        <p:nvPr/>
+      </p:nvGrpSpPr>
+      <p:grpSpPr>
+        <a:xfrm>
+          <a:off x="0" y="0"/>
+          <a:ext cx="0" cy="0"/>
+          <a:chOff x="0" y="0"/>
+          <a:chExt cx="0" cy="0"/>
+        </a:xfrm>
+      </p:grpSpPr>
+      <p:sp>
+        <p:nvSpPr>
+          <p:cNvPr id="4" name="Date Placeholder 3">
+            <a:extLst>
+              <a:ext uri="{FF2B5EF4-FFF2-40B4-BE49-F238E27FC236}">
+                <a16:creationId xmlns:a16="http://schemas.microsoft.com/office/drawing/2014/main" id="{68A2AA6F-3EE6-4C30-8194-A7D76E01E0D4}"/>
+              </a:ext>
+            </a:extLst>
+          </p:cNvPr>
+          <p:cNvSpPr>
+            <a:spLocks noGrp="1"/>
+          </p:cNvSpPr>
+          <p:nvPr>
+            <p:ph type="dt" sz="half" idx="10"/>
+          </p:nvPr>
+        </p:nvSpPr>
+        <p:spPr/>
+        <p:txBody>
+          <a:bodyPr/>
+          <a:lstStyle/>
+          <a:p>
+            <a:fld id="{6C5F12B0-F81A-DB4D-AAAD-60AACFE3ADC2}" type="datetime2">
+              <a:rPr lang="en-AU" smtClean="0"/>
+              <a:t>Saturday, 26 October 2019</a:t>
+            </a:fld>
+            <a:endParaRPr lang="en-US" dirty="0"/>
+          </a:p>
+        </p:txBody>
+      </p:sp>
+      <p:sp>
+        <p:nvSpPr>
+          <p:cNvPr id="5" name="Slide Number Placeholder 4">
+            <a:extLst>
+              <a:ext uri="{FF2B5EF4-FFF2-40B4-BE49-F238E27FC236}">
+                <a16:creationId xmlns:a16="http://schemas.microsoft.com/office/drawing/2014/main" id="{685C58BE-378D-4A26-8E3A-1BF97E4DC73B}"/>
+              </a:ext>
+            </a:extLst>
+          </p:cNvPr>
+          <p:cNvSpPr>
+            <a:spLocks noGrp="1"/>
+          </p:cNvSpPr>
+          <p:nvPr>
+            <p:ph type="sldNum" sz="quarter" idx="12"/>
+          </p:nvPr>
+        </p:nvSpPr>
+        <p:spPr/>
+        <p:txBody>
+          <a:bodyPr/>
+          <a:lstStyle/>
+          <a:p>
+            <a:fld id="{595DB3E5-CC39-264C-BD9B-DB8B2147D646}" type="slidenum">
+              <a:rPr lang="en-US" smtClean="0"/>
+              <a:t>7</a:t>
+            </a:fld>
+            <a:endParaRPr lang="en-US"/>
+          </a:p>
+        </p:txBody>
+      </p:sp>
+    </p:spTree>
+    <p:extLst>
+      <p:ext uri="{BB962C8B-B14F-4D97-AF65-F5344CB8AC3E}">
+        <p14:creationId xmlns:p14="http://schemas.microsoft.com/office/powerpoint/2010/main" val="4024029851"/>
       </p:ext>
     </p:extLst>
   </p:cSld>

</xml_diff>